<commit_message>
added table support + fixed parsing issue
</commit_message>
<xml_diff>
--- a/src/main/resources/templates/sample_template.pptx
+++ b/src/main/resources/templates/sample_template.pptx
@@ -104,6 +104,11 @@
       </a:defRPr>
     </a:lvl9pPr>
   </p:defaultTextStyle>
+  <p:extLst>
+    <p:ext uri="{EFAFB233-063F-42B5-8137-9DF3F51BA10A}">
+      <p15:sldGuideLst xmlns:p15="http://schemas.microsoft.com/office/powerpoint/2012/main"/>
+    </p:ext>
+  </p:extLst>
 </p:presentation>
 </file>
 
@@ -254,7 +259,7 @@
           <a:p>
             <a:fld id="{2C786FC3-5027-4581-82DA-260E87DE0206}" type="datetimeFigureOut">
               <a:rPr lang="en-US" smtClean="0"/>
-              <a:t>5/16/2025</a:t>
+              <a:t>5/22/2025</a:t>
             </a:fld>
             <a:endParaRPr lang="en-US"/>
           </a:p>
@@ -452,7 +457,7 @@
           <a:p>
             <a:fld id="{2C786FC3-5027-4581-82DA-260E87DE0206}" type="datetimeFigureOut">
               <a:rPr lang="en-US" smtClean="0"/>
-              <a:t>5/16/2025</a:t>
+              <a:t>5/22/2025</a:t>
             </a:fld>
             <a:endParaRPr lang="en-US"/>
           </a:p>
@@ -660,7 +665,7 @@
           <a:p>
             <a:fld id="{2C786FC3-5027-4581-82DA-260E87DE0206}" type="datetimeFigureOut">
               <a:rPr lang="en-US" smtClean="0"/>
-              <a:t>5/16/2025</a:t>
+              <a:t>5/22/2025</a:t>
             </a:fld>
             <a:endParaRPr lang="en-US"/>
           </a:p>
@@ -858,7 +863,7 @@
           <a:p>
             <a:fld id="{2C786FC3-5027-4581-82DA-260E87DE0206}" type="datetimeFigureOut">
               <a:rPr lang="en-US" smtClean="0"/>
-              <a:t>5/16/2025</a:t>
+              <a:t>5/22/2025</a:t>
             </a:fld>
             <a:endParaRPr lang="en-US"/>
           </a:p>
@@ -1133,7 +1138,7 @@
           <a:p>
             <a:fld id="{2C786FC3-5027-4581-82DA-260E87DE0206}" type="datetimeFigureOut">
               <a:rPr lang="en-US" smtClean="0"/>
-              <a:t>5/16/2025</a:t>
+              <a:t>5/22/2025</a:t>
             </a:fld>
             <a:endParaRPr lang="en-US"/>
           </a:p>
@@ -1398,7 +1403,7 @@
           <a:p>
             <a:fld id="{2C786FC3-5027-4581-82DA-260E87DE0206}" type="datetimeFigureOut">
               <a:rPr lang="en-US" smtClean="0"/>
-              <a:t>5/16/2025</a:t>
+              <a:t>5/22/2025</a:t>
             </a:fld>
             <a:endParaRPr lang="en-US"/>
           </a:p>
@@ -1810,7 +1815,7 @@
           <a:p>
             <a:fld id="{2C786FC3-5027-4581-82DA-260E87DE0206}" type="datetimeFigureOut">
               <a:rPr lang="en-US" smtClean="0"/>
-              <a:t>5/16/2025</a:t>
+              <a:t>5/22/2025</a:t>
             </a:fld>
             <a:endParaRPr lang="en-US"/>
           </a:p>
@@ -1951,7 +1956,7 @@
           <a:p>
             <a:fld id="{2C786FC3-5027-4581-82DA-260E87DE0206}" type="datetimeFigureOut">
               <a:rPr lang="en-US" smtClean="0"/>
-              <a:t>5/16/2025</a:t>
+              <a:t>5/22/2025</a:t>
             </a:fld>
             <a:endParaRPr lang="en-US"/>
           </a:p>
@@ -2064,7 +2069,7 @@
           <a:p>
             <a:fld id="{2C786FC3-5027-4581-82DA-260E87DE0206}" type="datetimeFigureOut">
               <a:rPr lang="en-US" smtClean="0"/>
-              <a:t>5/16/2025</a:t>
+              <a:t>5/22/2025</a:t>
             </a:fld>
             <a:endParaRPr lang="en-US"/>
           </a:p>
@@ -2375,7 +2380,7 @@
           <a:p>
             <a:fld id="{2C786FC3-5027-4581-82DA-260E87DE0206}" type="datetimeFigureOut">
               <a:rPr lang="en-US" smtClean="0"/>
-              <a:t>5/16/2025</a:t>
+              <a:t>5/22/2025</a:t>
             </a:fld>
             <a:endParaRPr lang="en-US"/>
           </a:p>
@@ -2663,7 +2668,7 @@
           <a:p>
             <a:fld id="{2C786FC3-5027-4581-82DA-260E87DE0206}" type="datetimeFigureOut">
               <a:rPr lang="en-US" smtClean="0"/>
-              <a:t>5/16/2025</a:t>
+              <a:t>5/22/2025</a:t>
             </a:fld>
             <a:endParaRPr lang="en-US"/>
           </a:p>
@@ -2904,7 +2909,7 @@
           <a:p>
             <a:fld id="{2C786FC3-5027-4581-82DA-260E87DE0206}" type="datetimeFigureOut">
               <a:rPr lang="en-US" smtClean="0"/>
-              <a:t>5/16/2025</a:t>
+              <a:t>5/22/2025</a:t>
             </a:fld>
             <a:endParaRPr lang="en-US"/>
           </a:p>
@@ -3337,9 +3342,16 @@
             <p:ph type="ctrTitle"/>
           </p:nvPr>
         </p:nvSpPr>
-        <p:spPr/>
-        <p:txBody>
-          <a:bodyPr/>
+        <p:spPr>
+          <a:xfrm>
+            <a:off x="1524000" y="3236913"/>
+            <a:ext cx="9144000" cy="2387600"/>
+          </a:xfrm>
+        </p:spPr>
+        <p:txBody>
+          <a:bodyPr>
+            <a:normAutofit fontScale="90000"/>
+          </a:bodyPr>
           <a:lstStyle/>
           <a:p>
             <a:pPr marL="0" marR="0">
@@ -3349,6 +3361,7 @@
               <a:spcAft>
                 <a:spcPts val="800"/>
               </a:spcAft>
+              <a:buNone/>
             </a:pPr>
             <a:r>
               <a:rPr lang="en-US" sz="1800" kern="100" dirty="0">
@@ -3393,6 +3406,75 @@
               </a:rPr>
               <a:t>Date: ${date}</a:t>
             </a:r>
+            <a:br>
+              <a:rPr lang="en-US" sz="1800" kern="100" dirty="0">
+                <a:effectLst/>
+                <a:latin typeface="Aptos" panose="020B0004020202020204" pitchFamily="34" charset="0"/>
+                <a:ea typeface="Aptos" panose="020B0004020202020204" pitchFamily="34" charset="0"/>
+                <a:cs typeface="Times New Roman" panose="02020603050405020304" pitchFamily="18" charset="0"/>
+              </a:rPr>
+            </a:br>
+            <a:r>
+              <a:rPr lang="en-US" sz="1800" kern="100" dirty="0">
+                <a:effectLst/>
+                <a:latin typeface="Aptos" panose="020B0004020202020204" pitchFamily="34" charset="0"/>
+                <a:ea typeface="Aptos" panose="020B0004020202020204" pitchFamily="34" charset="0"/>
+                <a:cs typeface="Times New Roman" panose="02020603050405020304" pitchFamily="18" charset="0"/>
+              </a:rPr>
+              <a:t>Status: ${status}</a:t>
+            </a:r>
+            <a:br>
+              <a:rPr lang="en-US" sz="1800" kern="100" dirty="0">
+                <a:effectLst/>
+                <a:latin typeface="Aptos" panose="020B0004020202020204" pitchFamily="34" charset="0"/>
+                <a:ea typeface="Aptos" panose="020B0004020202020204" pitchFamily="34" charset="0"/>
+                <a:cs typeface="Times New Roman" panose="02020603050405020304" pitchFamily="18" charset="0"/>
+              </a:rPr>
+            </a:br>
+            <a:r>
+              <a:rPr lang="en-US" sz="1800" kern="100" dirty="0" err="1">
+                <a:effectLst/>
+                <a:latin typeface="Aptos" panose="020B0004020202020204" pitchFamily="34" charset="0"/>
+                <a:ea typeface="Aptos" panose="020B0004020202020204" pitchFamily="34" charset="0"/>
+                <a:cs typeface="Times New Roman" panose="02020603050405020304" pitchFamily="18" charset="0"/>
+              </a:rPr>
+              <a:t>totalAmount</a:t>
+            </a:r>
+            <a:r>
+              <a:rPr lang="en-US" sz="1800" kern="100" dirty="0">
+                <a:effectLst/>
+                <a:latin typeface="Aptos" panose="020B0004020202020204" pitchFamily="34" charset="0"/>
+                <a:ea typeface="Aptos" panose="020B0004020202020204" pitchFamily="34" charset="0"/>
+                <a:cs typeface="Times New Roman" panose="02020603050405020304" pitchFamily="18" charset="0"/>
+              </a:rPr>
+              <a:t>: ${</a:t>
+            </a:r>
+            <a:r>
+              <a:rPr lang="en-US" sz="1800" kern="100" dirty="0" err="1">
+                <a:effectLst/>
+                <a:latin typeface="Aptos" panose="020B0004020202020204" pitchFamily="34" charset="0"/>
+                <a:ea typeface="Aptos" panose="020B0004020202020204" pitchFamily="34" charset="0"/>
+                <a:cs typeface="Times New Roman" panose="02020603050405020304" pitchFamily="18" charset="0"/>
+              </a:rPr>
+              <a:t>totalAmount</a:t>
+            </a:r>
+            <a:r>
+              <a:rPr lang="en-US" sz="1800" kern="100" dirty="0">
+                <a:effectLst/>
+                <a:latin typeface="Aptos" panose="020B0004020202020204" pitchFamily="34" charset="0"/>
+                <a:ea typeface="Aptos" panose="020B0004020202020204" pitchFamily="34" charset="0"/>
+                <a:cs typeface="Times New Roman" panose="02020603050405020304" pitchFamily="18" charset="0"/>
+              </a:rPr>
+              <a:t>}</a:t>
+            </a:r>
+            <a:br>
+              <a:rPr lang="en-US" sz="1800" kern="100" dirty="0">
+                <a:effectLst/>
+                <a:latin typeface="Aptos" panose="020B0004020202020204" pitchFamily="34" charset="0"/>
+                <a:ea typeface="Aptos" panose="020B0004020202020204" pitchFamily="34" charset="0"/>
+                <a:cs typeface="Times New Roman" panose="02020603050405020304" pitchFamily="18" charset="0"/>
+              </a:rPr>
+            </a:br>
             <a:br>
               <a:rPr lang="en-US" sz="1800" kern="100" dirty="0">
                 <a:effectLst/>
@@ -3402,31 +3484,6 @@
               </a:rPr>
             </a:br>
             <a:endParaRPr lang="en-US" dirty="0"/>
-          </a:p>
-        </p:txBody>
-      </p:sp>
-      <p:sp>
-        <p:nvSpPr>
-          <p:cNvPr id="3" name="Subtitle 2">
-            <a:extLst>
-              <a:ext uri="{FF2B5EF4-FFF2-40B4-BE49-F238E27FC236}">
-                <a16:creationId xmlns:a16="http://schemas.microsoft.com/office/drawing/2014/main" id="{1D6C9115-8421-D848-5F2C-689B08EE1BE1}"/>
-              </a:ext>
-            </a:extLst>
-          </p:cNvPr>
-          <p:cNvSpPr>
-            <a:spLocks noGrp="1"/>
-          </p:cNvSpPr>
-          <p:nvPr>
-            <p:ph type="subTitle" idx="1"/>
-          </p:nvPr>
-        </p:nvSpPr>
-        <p:spPr/>
-        <p:txBody>
-          <a:bodyPr/>
-          <a:lstStyle/>
-          <a:p>
-            <a:endParaRPr lang="en-US"/>
           </a:p>
         </p:txBody>
       </p:sp>

</xml_diff>